<commit_message>
Added links to notebooks
</commit_message>
<xml_diff>
--- a/lecture5_ModelFitting.pptx
+++ b/lecture5_ModelFitting.pptx
@@ -5,7 +5,7 @@
     <p:sldMasterId id="2147483648" r:id="rId1"/>
   </p:sldMasterIdLst>
   <p:notesMasterIdLst>
-    <p:notesMasterId r:id="rId31"/>
+    <p:notesMasterId r:id="rId30"/>
   </p:notesMasterIdLst>
   <p:sldIdLst>
     <p:sldId id="256" r:id="rId2"/>
@@ -36,7 +36,6 @@
     <p:sldId id="278" r:id="rId27"/>
     <p:sldId id="279" r:id="rId28"/>
     <p:sldId id="284" r:id="rId29"/>
-    <p:sldId id="285" r:id="rId30"/>
   </p:sldIdLst>
   <p:sldSz cx="9144000" cy="6858000" type="screen4x3"/>
   <p:notesSz cx="6858000" cy="9144000"/>
@@ -7327,7 +7326,7 @@
           <a:graphicData uri="http://schemas.openxmlformats.org/presentationml/2006/ole">
             <mc:AlternateContent xmlns:mc="http://schemas.openxmlformats.org/markup-compatibility/2006">
               <mc:Choice xmlns:v="urn:schemas-microsoft-com:vml" Requires="v">
-                <p:oleObj spid="_x0000_s3078" name="Acrobat Document" r:id="rId3" imgW="5572025" imgH="4200449" progId="AcroExch.Document.7">
+                <p:oleObj spid="_x0000_s3080" name="Acrobat Document" r:id="rId3" imgW="5572025" imgH="4200449" progId="AcroExch.Document.7">
                   <p:embed/>
                 </p:oleObj>
               </mc:Choice>
@@ -9613,27 +9612,7 @@
                 <a:ea typeface="WenQuanYi Zen Hei" pitchFamily="2"/>
                 <a:cs typeface="Lohit Hindi" pitchFamily="2"/>
               </a:rPr>
-              <a:t> </a:t>
-            </a:r>
-            <a:r>
-              <a:rPr lang="es-ES" sz="4400" b="1" dirty="0" smtClean="0">
-                <a:solidFill>
-                  <a:schemeClr val="accent1">
-                    <a:lumMod val="75000"/>
-                  </a:schemeClr>
-                </a:solidFill>
-                <a:effectLst>
-                  <a:outerShdw blurRad="50800" dist="38100" dir="2700000" algn="tl" rotWithShape="0">
-                    <a:prstClr val="black">
-                      <a:alpha val="40000"/>
-                    </a:prstClr>
-                  </a:outerShdw>
-                </a:effectLst>
-                <a:latin typeface="Lato" pitchFamily="34" charset="0"/>
-                <a:ea typeface="WenQuanYi Zen Hei" pitchFamily="2"/>
-                <a:cs typeface="Lohit Hindi" pitchFamily="2"/>
-              </a:rPr>
-              <a:t>3</a:t>
+              <a:t> 3</a:t>
             </a:r>
             <a:endParaRPr lang="es-ES" sz="900" dirty="0">
               <a:solidFill>
@@ -14691,460 +14670,6 @@
     <p:extLst>
       <p:ext uri="{BB962C8B-B14F-4D97-AF65-F5344CB8AC3E}">
         <p14:creationId xmlns:p14="http://schemas.microsoft.com/office/powerpoint/2010/main" val="2032681388"/>
-      </p:ext>
-    </p:extLst>
-  </p:cSld>
-  <p:clrMapOvr>
-    <a:masterClrMapping/>
-  </p:clrMapOvr>
-  <p:timing>
-    <p:tnLst>
-      <p:par>
-        <p:cTn id="1" dur="indefinite" restart="never" nodeType="tmRoot"/>
-      </p:par>
-    </p:tnLst>
-  </p:timing>
-</p:sld>
-</file>
-
-<file path=ppt/slides/slide29.xml><?xml version="1.0" encoding="utf-8"?>
-<p:sld xmlns:a="http://schemas.openxmlformats.org/drawingml/2006/main" xmlns:r="http://schemas.openxmlformats.org/officeDocument/2006/relationships" xmlns:p="http://schemas.openxmlformats.org/presentationml/2006/main">
-  <p:cSld>
-    <p:spTree>
-      <p:nvGrpSpPr>
-        <p:cNvPr id="1" name=""/>
-        <p:cNvGrpSpPr/>
-        <p:nvPr/>
-      </p:nvGrpSpPr>
-      <p:grpSpPr>
-        <a:xfrm>
-          <a:off x="0" y="0"/>
-          <a:ext cx="0" cy="0"/>
-          <a:chOff x="0" y="0"/>
-          <a:chExt cx="0" cy="0"/>
-        </a:xfrm>
-      </p:grpSpPr>
-      <p:sp>
-        <p:nvSpPr>
-          <p:cNvPr id="2" name="TextBox 1"/>
-          <p:cNvSpPr txBox="1"/>
-          <p:nvPr/>
-        </p:nvSpPr>
-        <p:spPr>
-          <a:xfrm>
-            <a:off x="2716364" y="76200"/>
-            <a:ext cx="3711272" cy="461665"/>
-          </a:xfrm>
-          <a:prstGeom prst="rect">
-            <a:avLst/>
-          </a:prstGeom>
-          <a:noFill/>
-        </p:spPr>
-        <p:txBody>
-          <a:bodyPr wrap="none" rtlCol="0">
-            <a:spAutoFit/>
-          </a:bodyPr>
-          <a:lstStyle/>
-          <a:p>
-            <a:r>
-              <a:rPr lang="es-ES" sz="2400" err="1" smtClean="0">
-                <a:solidFill>
-                  <a:srgbClr val="72BFC5"/>
-                </a:solidFill>
-                <a:latin typeface="Roboto" pitchFamily="2" charset="0"/>
-                <a:ea typeface="Roboto" pitchFamily="2" charset="0"/>
-              </a:rPr>
-              <a:t>Weak-field</a:t>
-            </a:r>
-            <a:r>
-              <a:rPr lang="es-ES" sz="2400" dirty="0" smtClean="0">
-                <a:solidFill>
-                  <a:srgbClr val="72BFC5"/>
-                </a:solidFill>
-                <a:latin typeface="Roboto" pitchFamily="2" charset="0"/>
-                <a:ea typeface="Roboto" pitchFamily="2" charset="0"/>
-              </a:rPr>
-              <a:t> </a:t>
-            </a:r>
-            <a:r>
-              <a:rPr lang="es-ES" sz="2400" dirty="0" err="1" smtClean="0">
-                <a:solidFill>
-                  <a:srgbClr val="72BFC5"/>
-                </a:solidFill>
-                <a:latin typeface="Roboto" pitchFamily="2" charset="0"/>
-                <a:ea typeface="Roboto" pitchFamily="2" charset="0"/>
-              </a:rPr>
-              <a:t>approximation</a:t>
-            </a:r>
-            <a:endParaRPr lang="es-ES" sz="2400" dirty="0" smtClean="0">
-              <a:solidFill>
-                <a:srgbClr val="72BFC5"/>
-              </a:solidFill>
-              <a:latin typeface="Roboto" pitchFamily="2" charset="0"/>
-              <a:ea typeface="Roboto" pitchFamily="2" charset="0"/>
-            </a:endParaRPr>
-          </a:p>
-        </p:txBody>
-      </p:sp>
-      <p:sp>
-        <p:nvSpPr>
-          <p:cNvPr id="5" name="TextBox 4"/>
-          <p:cNvSpPr txBox="1"/>
-          <p:nvPr/>
-        </p:nvSpPr>
-        <p:spPr>
-          <a:xfrm>
-            <a:off x="609600" y="1371600"/>
-            <a:ext cx="7723589" cy="707886"/>
-          </a:xfrm>
-          <a:prstGeom prst="rect">
-            <a:avLst/>
-          </a:prstGeom>
-          <a:noFill/>
-        </p:spPr>
-        <p:txBody>
-          <a:bodyPr wrap="none" rtlCol="0">
-            <a:spAutoFit/>
-          </a:bodyPr>
-          <a:lstStyle/>
-          <a:p>
-            <a:r>
-              <a:rPr lang="es-ES" dirty="0" err="1" smtClean="0">
-                <a:latin typeface="Roboto Light" pitchFamily="2" charset="0"/>
-                <a:ea typeface="Roboto Light" pitchFamily="2" charset="0"/>
-              </a:rPr>
-              <a:t>Aim</a:t>
-            </a:r>
-            <a:r>
-              <a:rPr lang="es-ES" dirty="0" smtClean="0">
-                <a:latin typeface="Roboto Light" pitchFamily="2" charset="0"/>
-                <a:ea typeface="Roboto Light" pitchFamily="2" charset="0"/>
-              </a:rPr>
-              <a:t>: use </a:t>
-            </a:r>
-            <a:r>
-              <a:rPr lang="es-ES" dirty="0" err="1" smtClean="0">
-                <a:latin typeface="Roboto Light" pitchFamily="2" charset="0"/>
-                <a:ea typeface="Roboto Light" pitchFamily="2" charset="0"/>
-              </a:rPr>
-              <a:t>the</a:t>
-            </a:r>
-            <a:r>
-              <a:rPr lang="es-ES" dirty="0" smtClean="0">
-                <a:latin typeface="Roboto Light" pitchFamily="2" charset="0"/>
-                <a:ea typeface="Roboto Light" pitchFamily="2" charset="0"/>
-              </a:rPr>
-              <a:t> </a:t>
-            </a:r>
-            <a:r>
-              <a:rPr lang="es-ES" dirty="0" err="1" smtClean="0">
-                <a:latin typeface="Roboto Light" pitchFamily="2" charset="0"/>
-                <a:ea typeface="Roboto Light" pitchFamily="2" charset="0"/>
-              </a:rPr>
-              <a:t>techniques</a:t>
-            </a:r>
-            <a:r>
-              <a:rPr lang="es-ES" dirty="0" smtClean="0">
-                <a:latin typeface="Roboto Light" pitchFamily="2" charset="0"/>
-                <a:ea typeface="Roboto Light" pitchFamily="2" charset="0"/>
-              </a:rPr>
-              <a:t> </a:t>
-            </a:r>
-            <a:r>
-              <a:rPr lang="es-ES" dirty="0" err="1" smtClean="0">
-                <a:latin typeface="Roboto Light" pitchFamily="2" charset="0"/>
-                <a:ea typeface="Roboto Light" pitchFamily="2" charset="0"/>
-              </a:rPr>
-              <a:t>presented</a:t>
-            </a:r>
-            <a:r>
-              <a:rPr lang="es-ES" dirty="0" smtClean="0">
-                <a:latin typeface="Roboto Light" pitchFamily="2" charset="0"/>
-                <a:ea typeface="Roboto Light" pitchFamily="2" charset="0"/>
-              </a:rPr>
-              <a:t> </a:t>
-            </a:r>
-            <a:r>
-              <a:rPr lang="es-ES" dirty="0" err="1" smtClean="0">
-                <a:latin typeface="Roboto Light" pitchFamily="2" charset="0"/>
-                <a:ea typeface="Roboto Light" pitchFamily="2" charset="0"/>
-              </a:rPr>
-              <a:t>before</a:t>
-            </a:r>
-            <a:r>
-              <a:rPr lang="es-ES" dirty="0" smtClean="0">
-                <a:latin typeface="Roboto Light" pitchFamily="2" charset="0"/>
-                <a:ea typeface="Roboto Light" pitchFamily="2" charset="0"/>
-              </a:rPr>
-              <a:t> </a:t>
-            </a:r>
-            <a:r>
-              <a:rPr lang="es-ES" dirty="0" err="1" smtClean="0">
-                <a:latin typeface="Roboto Light" pitchFamily="2" charset="0"/>
-                <a:ea typeface="Roboto Light" pitchFamily="2" charset="0"/>
-              </a:rPr>
-              <a:t>to</a:t>
-            </a:r>
-            <a:r>
-              <a:rPr lang="es-ES" dirty="0" smtClean="0">
-                <a:latin typeface="Roboto Light" pitchFamily="2" charset="0"/>
-                <a:ea typeface="Roboto Light" pitchFamily="2" charset="0"/>
-              </a:rPr>
-              <a:t> </a:t>
-            </a:r>
-            <a:r>
-              <a:rPr lang="es-ES" dirty="0" err="1" smtClean="0">
-                <a:latin typeface="Roboto Light" pitchFamily="2" charset="0"/>
-                <a:ea typeface="Roboto Light" pitchFamily="2" charset="0"/>
-              </a:rPr>
-              <a:t>estimate</a:t>
-            </a:r>
-            <a:r>
-              <a:rPr lang="es-ES" dirty="0" smtClean="0">
-                <a:latin typeface="Roboto Light" pitchFamily="2" charset="0"/>
-                <a:ea typeface="Roboto Light" pitchFamily="2" charset="0"/>
-              </a:rPr>
-              <a:t> </a:t>
-            </a:r>
-            <a:r>
-              <a:rPr lang="es-ES" dirty="0" err="1" smtClean="0">
-                <a:latin typeface="Roboto Light" pitchFamily="2" charset="0"/>
-                <a:ea typeface="Roboto Light" pitchFamily="2" charset="0"/>
-              </a:rPr>
-              <a:t>the</a:t>
-            </a:r>
-            <a:r>
-              <a:rPr lang="es-ES" dirty="0" smtClean="0">
-                <a:latin typeface="Roboto Light" pitchFamily="2" charset="0"/>
-                <a:ea typeface="Roboto Light" pitchFamily="2" charset="0"/>
-              </a:rPr>
-              <a:t> </a:t>
-            </a:r>
-            <a:r>
-              <a:rPr lang="es-ES" dirty="0" err="1" smtClean="0">
-                <a:latin typeface="Roboto Light" pitchFamily="2" charset="0"/>
-                <a:ea typeface="Roboto Light" pitchFamily="2" charset="0"/>
-              </a:rPr>
-              <a:t>magnetic</a:t>
-            </a:r>
-            <a:endParaRPr lang="es-ES" dirty="0">
-              <a:latin typeface="Roboto Light" pitchFamily="2" charset="0"/>
-              <a:ea typeface="Roboto Light" pitchFamily="2" charset="0"/>
-            </a:endParaRPr>
-          </a:p>
-          <a:p>
-            <a:r>
-              <a:rPr lang="es-ES" dirty="0" err="1" smtClean="0">
-                <a:latin typeface="Roboto Light" pitchFamily="2" charset="0"/>
-                <a:ea typeface="Roboto Light" pitchFamily="2" charset="0"/>
-              </a:rPr>
-              <a:t>field</a:t>
-            </a:r>
-            <a:r>
-              <a:rPr lang="es-ES" dirty="0" smtClean="0">
-                <a:latin typeface="Roboto Light" pitchFamily="2" charset="0"/>
-                <a:ea typeface="Roboto Light" pitchFamily="2" charset="0"/>
-              </a:rPr>
-              <a:t> </a:t>
-            </a:r>
-            <a:r>
-              <a:rPr lang="es-ES" dirty="0" err="1" smtClean="0">
-                <a:latin typeface="Roboto Light" pitchFamily="2" charset="0"/>
-                <a:ea typeface="Roboto Light" pitchFamily="2" charset="0"/>
-              </a:rPr>
-              <a:t>strength</a:t>
-            </a:r>
-            <a:r>
-              <a:rPr lang="es-ES" dirty="0" smtClean="0">
-                <a:latin typeface="Roboto Light" pitchFamily="2" charset="0"/>
-                <a:ea typeface="Roboto Light" pitchFamily="2" charset="0"/>
-              </a:rPr>
-              <a:t> in a simple case.</a:t>
-            </a:r>
-            <a:endParaRPr lang="en-US" dirty="0" err="1" smtClean="0">
-              <a:latin typeface="Roboto Light" pitchFamily="2" charset="0"/>
-              <a:ea typeface="Roboto Light" pitchFamily="2" charset="0"/>
-            </a:endParaRPr>
-          </a:p>
-        </p:txBody>
-      </p:sp>
-      <p:sp>
-        <p:nvSpPr>
-          <p:cNvPr id="7" name="TextBox 6"/>
-          <p:cNvSpPr txBox="1"/>
-          <p:nvPr/>
-        </p:nvSpPr>
-        <p:spPr>
-          <a:xfrm>
-            <a:off x="609600" y="2743200"/>
-            <a:ext cx="7746031" cy="400110"/>
-          </a:xfrm>
-          <a:prstGeom prst="rect">
-            <a:avLst/>
-          </a:prstGeom>
-          <a:noFill/>
-        </p:spPr>
-        <p:txBody>
-          <a:bodyPr wrap="none" rtlCol="0">
-            <a:spAutoFit/>
-          </a:bodyPr>
-          <a:lstStyle/>
-          <a:p>
-            <a:r>
-              <a:rPr lang="es-ES" dirty="0" err="1" smtClean="0">
-                <a:latin typeface="Roboto Light" pitchFamily="2" charset="0"/>
-                <a:ea typeface="Roboto Light" pitchFamily="2" charset="0"/>
-              </a:rPr>
-              <a:t>Now</a:t>
-            </a:r>
-            <a:r>
-              <a:rPr lang="es-ES" dirty="0" smtClean="0">
-                <a:latin typeface="Roboto Light" pitchFamily="2" charset="0"/>
-                <a:ea typeface="Roboto Light" pitchFamily="2" charset="0"/>
-              </a:rPr>
-              <a:t>, </a:t>
-            </a:r>
-            <a:r>
-              <a:rPr lang="es-ES" dirty="0" err="1" smtClean="0">
-                <a:latin typeface="Roboto Light" pitchFamily="2" charset="0"/>
-                <a:ea typeface="Roboto Light" pitchFamily="2" charset="0"/>
-              </a:rPr>
-              <a:t>take</a:t>
-            </a:r>
-            <a:r>
-              <a:rPr lang="es-ES" dirty="0" smtClean="0">
-                <a:latin typeface="Roboto Light" pitchFamily="2" charset="0"/>
-                <a:ea typeface="Roboto Light" pitchFamily="2" charset="0"/>
-              </a:rPr>
-              <a:t> </a:t>
-            </a:r>
-            <a:r>
-              <a:rPr lang="es-ES" dirty="0" err="1" smtClean="0">
-                <a:latin typeface="Roboto Light" pitchFamily="2" charset="0"/>
-                <a:ea typeface="Roboto Light" pitchFamily="2" charset="0"/>
-              </a:rPr>
-              <a:t>into</a:t>
-            </a:r>
-            <a:r>
-              <a:rPr lang="es-ES" dirty="0" smtClean="0">
-                <a:latin typeface="Roboto Light" pitchFamily="2" charset="0"/>
-                <a:ea typeface="Roboto Light" pitchFamily="2" charset="0"/>
-              </a:rPr>
-              <a:t> </a:t>
-            </a:r>
-            <a:r>
-              <a:rPr lang="es-ES" dirty="0" err="1" smtClean="0">
-                <a:latin typeface="Roboto Light" pitchFamily="2" charset="0"/>
-                <a:ea typeface="Roboto Light" pitchFamily="2" charset="0"/>
-              </a:rPr>
-              <a:t>account</a:t>
-            </a:r>
-            <a:r>
-              <a:rPr lang="es-ES" dirty="0" smtClean="0">
-                <a:latin typeface="Roboto Light" pitchFamily="2" charset="0"/>
-                <a:ea typeface="Roboto Light" pitchFamily="2" charset="0"/>
-              </a:rPr>
-              <a:t> </a:t>
-            </a:r>
-            <a:r>
-              <a:rPr lang="es-ES" dirty="0" err="1" smtClean="0">
-                <a:latin typeface="Roboto Light" pitchFamily="2" charset="0"/>
-                <a:ea typeface="Roboto Light" pitchFamily="2" charset="0"/>
-              </a:rPr>
-              <a:t>the</a:t>
-            </a:r>
-            <a:r>
-              <a:rPr lang="es-ES" dirty="0" smtClean="0">
-                <a:latin typeface="Roboto Light" pitchFamily="2" charset="0"/>
-                <a:ea typeface="Roboto Light" pitchFamily="2" charset="0"/>
-              </a:rPr>
-              <a:t> </a:t>
-            </a:r>
-            <a:r>
-              <a:rPr lang="es-ES" dirty="0" err="1" smtClean="0">
-                <a:latin typeface="Roboto Light" pitchFamily="2" charset="0"/>
-                <a:ea typeface="Roboto Light" pitchFamily="2" charset="0"/>
-              </a:rPr>
-              <a:t>presence</a:t>
-            </a:r>
-            <a:r>
-              <a:rPr lang="es-ES" dirty="0" smtClean="0">
-                <a:latin typeface="Roboto Light" pitchFamily="2" charset="0"/>
-                <a:ea typeface="Roboto Light" pitchFamily="2" charset="0"/>
-              </a:rPr>
-              <a:t> of </a:t>
-            </a:r>
-            <a:r>
-              <a:rPr lang="es-ES" dirty="0" err="1" smtClean="0">
-                <a:latin typeface="Roboto Light" pitchFamily="2" charset="0"/>
-                <a:ea typeface="Roboto Light" pitchFamily="2" charset="0"/>
-              </a:rPr>
-              <a:t>noise</a:t>
-            </a:r>
-            <a:r>
-              <a:rPr lang="es-ES" dirty="0" smtClean="0">
-                <a:latin typeface="Roboto Light" pitchFamily="2" charset="0"/>
-                <a:ea typeface="Roboto Light" pitchFamily="2" charset="0"/>
-              </a:rPr>
-              <a:t> </a:t>
-            </a:r>
-            <a:r>
-              <a:rPr lang="es-ES" dirty="0" err="1" smtClean="0">
-                <a:latin typeface="Roboto Light" pitchFamily="2" charset="0"/>
-                <a:ea typeface="Roboto Light" pitchFamily="2" charset="0"/>
-              </a:rPr>
-              <a:t>both</a:t>
-            </a:r>
-            <a:r>
-              <a:rPr lang="es-ES" dirty="0" smtClean="0">
-                <a:latin typeface="Roboto Light" pitchFamily="2" charset="0"/>
-                <a:ea typeface="Roboto Light" pitchFamily="2" charset="0"/>
-              </a:rPr>
-              <a:t> in Stokes I and V</a:t>
-            </a:r>
-            <a:endParaRPr lang="en-US" dirty="0" err="1" smtClean="0">
-              <a:latin typeface="Roboto Light" pitchFamily="2" charset="0"/>
-              <a:ea typeface="Roboto Light" pitchFamily="2" charset="0"/>
-            </a:endParaRPr>
-          </a:p>
-        </p:txBody>
-      </p:sp>
-      <p:pic>
-        <p:nvPicPr>
-          <p:cNvPr id="8" name="Picture 7">
-            <a:hlinkClick r:id="rId2"/>
-          </p:cNvPr>
-          <p:cNvPicPr>
-            <a:picLocks noChangeAspect="1"/>
-          </p:cNvPicPr>
-          <p:nvPr/>
-        </p:nvPicPr>
-        <p:blipFill>
-          <a:blip r:embed="rId3" cstate="print">
-            <a:extLst>
-              <a:ext uri="{28A0092B-C50C-407E-A947-70E740481C1C}">
-                <a14:useLocalDpi xmlns:a14="http://schemas.microsoft.com/office/drawing/2010/main" val="0"/>
-              </a:ext>
-            </a:extLst>
-          </a:blip>
-          <a:stretch>
-            <a:fillRect/>
-          </a:stretch>
-        </p:blipFill>
-        <p:spPr>
-          <a:xfrm>
-            <a:off x="8153400" y="5934075"/>
-            <a:ext cx="902902" cy="847725"/>
-          </a:xfrm>
-          <a:prstGeom prst="rect">
-            <a:avLst/>
-          </a:prstGeom>
-        </p:spPr>
-      </p:pic>
-    </p:spTree>
-    <p:extLst>
-      <p:ext uri="{BB962C8B-B14F-4D97-AF65-F5344CB8AC3E}">
-        <p14:creationId xmlns:p14="http://schemas.microsoft.com/office/powerpoint/2010/main" val="1146527659"/>
       </p:ext>
     </p:extLst>
   </p:cSld>
@@ -19564,7 +19089,7 @@
           <a:graphicData uri="http://schemas.openxmlformats.org/presentationml/2006/ole">
             <mc:AlternateContent xmlns:mc="http://schemas.openxmlformats.org/markup-compatibility/2006">
               <mc:Choice xmlns:v="urn:schemas-microsoft-com:vml" Requires="v">
-                <p:oleObj spid="_x0000_s1033" name="Acrobat Document" r:id="rId3" imgW="5572025" imgH="4200449" progId="AcroExch.Document.7">
+                <p:oleObj spid="_x0000_s1035" name="Acrobat Document" r:id="rId3" imgW="5572025" imgH="4200449" progId="AcroExch.Document.7">
                   <p:embed/>
                 </p:oleObj>
               </mc:Choice>

</xml_diff>